<commit_message>
further updates to both dashboard and presentation
</commit_message>
<xml_diff>
--- a/presentation/Presentation_COMBINED_FINAL DRAFT3.pptx
+++ b/presentation/Presentation_COMBINED_FINAL DRAFT3.pptx
@@ -163,6 +163,43 @@
 </p:cmAuthorLst>
 </file>
 
+<file path=ppt/changesInfos/changesInfo1.xml><?xml version="1.0" encoding="utf-8"?>
+<pc:chgInfo xmlns:a="http://schemas.openxmlformats.org/drawingml/2006/main" xmlns:r="http://schemas.openxmlformats.org/officeDocument/2006/relationships" xmlns:ac="http://schemas.microsoft.com/office/drawing/2013/main/command" xmlns:pc="http://schemas.microsoft.com/office/powerpoint/2013/main/command">
+  <pc:docChgLst>
+    <pc:chgData name="Alexei Brown" userId="854d37e01b05ea2c" providerId="LiveId" clId="{9BD393D9-631D-47EF-97E0-1D65B3A1FFC9}"/>
+    <pc:docChg chg="custSel modSld">
+      <pc:chgData name="Alexei Brown" userId="854d37e01b05ea2c" providerId="LiveId" clId="{9BD393D9-631D-47EF-97E0-1D65B3A1FFC9}" dt="2025-06-10T22:49:50.230" v="5" actId="1076"/>
+      <pc:docMkLst>
+        <pc:docMk/>
+      </pc:docMkLst>
+      <pc:sldChg chg="addSp delSp modSp mod">
+        <pc:chgData name="Alexei Brown" userId="854d37e01b05ea2c" providerId="LiveId" clId="{9BD393D9-631D-47EF-97E0-1D65B3A1FFC9}" dt="2025-06-10T22:49:50.230" v="5" actId="1076"/>
+        <pc:sldMkLst>
+          <pc:docMk/>
+          <pc:sldMk cId="4294303424" sldId="326"/>
+        </pc:sldMkLst>
+        <pc:spChg chg="del">
+          <ac:chgData name="Alexei Brown" userId="854d37e01b05ea2c" providerId="LiveId" clId="{9BD393D9-631D-47EF-97E0-1D65B3A1FFC9}" dt="2025-06-10T22:47:02.171" v="0" actId="478"/>
+          <ac:spMkLst>
+            <pc:docMk/>
+            <pc:sldMk cId="4294303424" sldId="326"/>
+            <ac:spMk id="3" creationId="{DFBC6E60-EEF1-85D8-A0B6-ADBFCE59B09E}"/>
+          </ac:spMkLst>
+        </pc:spChg>
+        <pc:picChg chg="add mod">
+          <ac:chgData name="Alexei Brown" userId="854d37e01b05ea2c" providerId="LiveId" clId="{9BD393D9-631D-47EF-97E0-1D65B3A1FFC9}" dt="2025-06-10T22:49:50.230" v="5" actId="1076"/>
+          <ac:picMkLst>
+            <pc:docMk/>
+            <pc:sldMk cId="4294303424" sldId="326"/>
+            <ac:picMk id="5" creationId="{104D43F8-46E7-9D71-91AE-9955B34E3818}"/>
+          </ac:picMkLst>
+        </pc:picChg>
+      </pc:sldChg>
+    </pc:docChg>
+  </pc:docChgLst>
+</pc:chgInfo>
+</file>
+
 <file path=ppt/slideLayouts/slideLayout1.xml><?xml version="1.0" encoding="utf-8"?>
 <p:sldLayout xmlns:a="http://schemas.openxmlformats.org/drawingml/2006/main" xmlns:r="http://schemas.openxmlformats.org/officeDocument/2006/relationships" xmlns:p="http://schemas.openxmlformats.org/presentationml/2006/main" type="title" preserve="1">
   <p:cSld name="Title Slide">
@@ -354,7 +391,7 @@
           <a:p>
             <a:fld id="{DA3B9161-6D8B-43AD-8C72-E62FA32C91DD}" type="datetimeFigureOut">
               <a:rPr lang="en-AU" smtClean="0"/>
-              <a:t>10/06/2025</a:t>
+              <a:t>11/06/2025</a:t>
             </a:fld>
             <a:endParaRPr lang="en-AU"/>
           </a:p>
@@ -790,7 +827,7 @@
           <a:p>
             <a:fld id="{DA3B9161-6D8B-43AD-8C72-E62FA32C91DD}" type="datetimeFigureOut">
               <a:rPr lang="en-AU" smtClean="0"/>
-              <a:t>10/06/2025</a:t>
+              <a:t>11/06/2025</a:t>
             </a:fld>
             <a:endParaRPr lang="en-AU"/>
           </a:p>
@@ -1040,7 +1077,7 @@
           <a:p>
             <a:fld id="{DA3B9161-6D8B-43AD-8C72-E62FA32C91DD}" type="datetimeFigureOut">
               <a:rPr lang="en-AU" smtClean="0"/>
-              <a:t>10/06/2025</a:t>
+              <a:t>11/06/2025</a:t>
             </a:fld>
             <a:endParaRPr lang="en-AU"/>
           </a:p>
@@ -1348,7 +1385,7 @@
           <a:p>
             <a:fld id="{DA3B9161-6D8B-43AD-8C72-E62FA32C91DD}" type="datetimeFigureOut">
               <a:rPr lang="en-AU" smtClean="0"/>
-              <a:t>10/06/2025</a:t>
+              <a:t>11/06/2025</a:t>
             </a:fld>
             <a:endParaRPr lang="en-AU"/>
           </a:p>
@@ -1666,7 +1703,7 @@
           <a:p>
             <a:fld id="{DA3B9161-6D8B-43AD-8C72-E62FA32C91DD}" type="datetimeFigureOut">
               <a:rPr lang="en-AU" smtClean="0"/>
-              <a:t>10/06/2025</a:t>
+              <a:t>11/06/2025</a:t>
             </a:fld>
             <a:endParaRPr lang="en-AU"/>
           </a:p>
@@ -1968,7 +2005,7 @@
           <a:p>
             <a:fld id="{DA3B9161-6D8B-43AD-8C72-E62FA32C91DD}" type="datetimeFigureOut">
               <a:rPr lang="en-AU" smtClean="0"/>
-              <a:t>10/06/2025</a:t>
+              <a:t>11/06/2025</a:t>
             </a:fld>
             <a:endParaRPr lang="en-AU"/>
           </a:p>
@@ -2335,7 +2372,7 @@
           <a:p>
             <a:fld id="{DA3B9161-6D8B-43AD-8C72-E62FA32C91DD}" type="datetimeFigureOut">
               <a:rPr lang="en-AU" smtClean="0"/>
-              <a:t>10/06/2025</a:t>
+              <a:t>11/06/2025</a:t>
             </a:fld>
             <a:endParaRPr lang="en-AU"/>
           </a:p>
@@ -2509,7 +2546,7 @@
           <a:p>
             <a:fld id="{DA3B9161-6D8B-43AD-8C72-E62FA32C91DD}" type="datetimeFigureOut">
               <a:rPr lang="en-AU" smtClean="0"/>
-              <a:t>10/06/2025</a:t>
+              <a:t>11/06/2025</a:t>
             </a:fld>
             <a:endParaRPr lang="en-AU"/>
           </a:p>
@@ -2689,7 +2726,7 @@
           <a:p>
             <a:fld id="{DA3B9161-6D8B-43AD-8C72-E62FA32C91DD}" type="datetimeFigureOut">
               <a:rPr lang="en-AU" smtClean="0"/>
-              <a:t>10/06/2025</a:t>
+              <a:t>11/06/2025</a:t>
             </a:fld>
             <a:endParaRPr lang="en-AU"/>
           </a:p>
@@ -2859,7 +2896,7 @@
           <a:p>
             <a:fld id="{DA3B9161-6D8B-43AD-8C72-E62FA32C91DD}" type="datetimeFigureOut">
               <a:rPr lang="en-AU" smtClean="0"/>
-              <a:t>10/06/2025</a:t>
+              <a:t>11/06/2025</a:t>
             </a:fld>
             <a:endParaRPr lang="en-AU"/>
           </a:p>
@@ -3109,7 +3146,7 @@
           <a:p>
             <a:fld id="{DA3B9161-6D8B-43AD-8C72-E62FA32C91DD}" type="datetimeFigureOut">
               <a:rPr lang="en-AU" smtClean="0"/>
-              <a:t>10/06/2025</a:t>
+              <a:t>11/06/2025</a:t>
             </a:fld>
             <a:endParaRPr lang="en-AU"/>
           </a:p>
@@ -3345,7 +3382,7 @@
           <a:p>
             <a:fld id="{DA3B9161-6D8B-43AD-8C72-E62FA32C91DD}" type="datetimeFigureOut">
               <a:rPr lang="en-AU" smtClean="0"/>
-              <a:t>10/06/2025</a:t>
+              <a:t>11/06/2025</a:t>
             </a:fld>
             <a:endParaRPr lang="en-AU"/>
           </a:p>
@@ -3727,7 +3764,7 @@
           <a:p>
             <a:fld id="{DA3B9161-6D8B-43AD-8C72-E62FA32C91DD}" type="datetimeFigureOut">
               <a:rPr lang="en-AU" smtClean="0"/>
-              <a:t>10/06/2025</a:t>
+              <a:t>11/06/2025</a:t>
             </a:fld>
             <a:endParaRPr lang="en-AU"/>
           </a:p>
@@ -3845,7 +3882,7 @@
           <a:p>
             <a:fld id="{DA3B9161-6D8B-43AD-8C72-E62FA32C91DD}" type="datetimeFigureOut">
               <a:rPr lang="en-AU" smtClean="0"/>
-              <a:t>10/06/2025</a:t>
+              <a:t>11/06/2025</a:t>
             </a:fld>
             <a:endParaRPr lang="en-AU"/>
           </a:p>
@@ -3940,7 +3977,7 @@
           <a:p>
             <a:fld id="{DA3B9161-6D8B-43AD-8C72-E62FA32C91DD}" type="datetimeFigureOut">
               <a:rPr lang="en-AU" smtClean="0"/>
-              <a:t>10/06/2025</a:t>
+              <a:t>11/06/2025</a:t>
             </a:fld>
             <a:endParaRPr lang="en-AU"/>
           </a:p>
@@ -4195,7 +4232,7 @@
           <a:p>
             <a:fld id="{DA3B9161-6D8B-43AD-8C72-E62FA32C91DD}" type="datetimeFigureOut">
               <a:rPr lang="en-AU" smtClean="0"/>
-              <a:t>10/06/2025</a:t>
+              <a:t>11/06/2025</a:t>
             </a:fld>
             <a:endParaRPr lang="en-AU"/>
           </a:p>
@@ -4478,7 +4515,7 @@
           <a:p>
             <a:fld id="{DA3B9161-6D8B-43AD-8C72-E62FA32C91DD}" type="datetimeFigureOut">
               <a:rPr lang="en-AU" smtClean="0"/>
-              <a:t>10/06/2025</a:t>
+              <a:t>11/06/2025</a:t>
             </a:fld>
             <a:endParaRPr lang="en-AU"/>
           </a:p>
@@ -4905,7 +4942,7 @@
           <a:p>
             <a:fld id="{DA3B9161-6D8B-43AD-8C72-E62FA32C91DD}" type="datetimeFigureOut">
               <a:rPr lang="en-AU" smtClean="0"/>
-              <a:t>10/06/2025</a:t>
+              <a:t>11/06/2025</a:t>
             </a:fld>
             <a:endParaRPr lang="en-AU"/>
           </a:p>
@@ -18955,31 +18992,36 @@
           </a:p>
         </p:txBody>
       </p:sp>
-      <p:sp>
-        <p:nvSpPr>
-          <p:cNvPr id="3" name="Content Placeholder 2">
+      <p:pic>
+        <p:nvPicPr>
+          <p:cNvPr id="5" name="Picture 4">
             <a:extLst>
               <a:ext uri="{FF2B5EF4-FFF2-40B4-BE49-F238E27FC236}">
-                <a16:creationId xmlns:a16="http://schemas.microsoft.com/office/drawing/2014/main" id="{DFBC6E60-EEF1-85D8-A0B6-ADBFCE59B09E}"/>
+                <a16:creationId xmlns:a16="http://schemas.microsoft.com/office/drawing/2014/main" id="{104D43F8-46E7-9D71-91AE-9955B34E3818}"/>
               </a:ext>
             </a:extLst>
           </p:cNvPr>
-          <p:cNvSpPr>
-            <a:spLocks noGrp="1"/>
-          </p:cNvSpPr>
-          <p:nvPr>
-            <p:ph idx="1"/>
-          </p:nvPr>
-        </p:nvSpPr>
-        <p:spPr/>
-        <p:txBody>
-          <a:bodyPr/>
-          <a:lstStyle/>
-          <a:p>
-            <a:endParaRPr lang="en-GB"/>
-          </a:p>
-        </p:txBody>
-      </p:sp>
+          <p:cNvPicPr>
+            <a:picLocks noChangeAspect="1"/>
+          </p:cNvPicPr>
+          <p:nvPr/>
+        </p:nvPicPr>
+        <p:blipFill>
+          <a:blip r:embed="rId2"/>
+          <a:stretch>
+            <a:fillRect/>
+          </a:stretch>
+        </p:blipFill>
+        <p:spPr>
+          <a:xfrm>
+            <a:off x="684212" y="186917"/>
+            <a:ext cx="7361923" cy="4727979"/>
+          </a:xfrm>
+          <a:prstGeom prst="rect">
+            <a:avLst/>
+          </a:prstGeom>
+        </p:spPr>
+      </p:pic>
     </p:spTree>
     <p:extLst>
       <p:ext uri="{BB962C8B-B14F-4D97-AF65-F5344CB8AC3E}">

</xml_diff>